<commit_message>
revise MLMI7 - Lecture 3
</commit_message>
<xml_diff>
--- a/MLMI7_Reinforcement_Learning_and_Decision_Making/images/figures.pptx
+++ b/MLMI7_Reinforcement_Learning_and_Decision_Making/images/figures.pptx
@@ -7,6 +7,7 @@
   <p:sldIdLst>
     <p:sldId id="256" r:id="rId2"/>
     <p:sldId id="257" r:id="rId3"/>
+    <p:sldId id="258" r:id="rId4"/>
   </p:sldIdLst>
   <p:sldSz cx="12192000" cy="6858000"/>
   <p:notesSz cx="6858000" cy="9144000"/>
@@ -5120,6 +5121,1154 @@
 </p:sld>
 </file>
 
+<file path=ppt/slides/slide3.xml><?xml version="1.0" encoding="utf-8"?>
+<p:sld xmlns:a="http://schemas.openxmlformats.org/drawingml/2006/main" xmlns:r="http://schemas.openxmlformats.org/officeDocument/2006/relationships" xmlns:p="http://schemas.openxmlformats.org/presentationml/2006/main">
+  <p:cSld>
+    <p:spTree>
+      <p:nvGrpSpPr>
+        <p:cNvPr id="1" name=""/>
+        <p:cNvGrpSpPr/>
+        <p:nvPr/>
+      </p:nvGrpSpPr>
+      <p:grpSpPr>
+        <a:xfrm>
+          <a:off x="0" y="0"/>
+          <a:ext cx="0" cy="0"/>
+          <a:chOff x="0" y="0"/>
+          <a:chExt cx="0" cy="0"/>
+        </a:xfrm>
+      </p:grpSpPr>
+      <p:cxnSp>
+        <p:nvCxnSpPr>
+          <p:cNvPr id="43" name="Straight Connector 42">
+            <a:extLst>
+              <a:ext uri="{FF2B5EF4-FFF2-40B4-BE49-F238E27FC236}">
+                <a16:creationId xmlns:a16="http://schemas.microsoft.com/office/drawing/2014/main" id="{48C717D4-DE9E-BC43-97A4-5A8A26783703}"/>
+              </a:ext>
+            </a:extLst>
+          </p:cNvPr>
+          <p:cNvCxnSpPr>
+            <a:cxnSpLocks/>
+          </p:cNvCxnSpPr>
+          <p:nvPr/>
+        </p:nvCxnSpPr>
+        <p:spPr>
+          <a:xfrm>
+            <a:off x="4141783" y="1884740"/>
+            <a:ext cx="1333369" cy="936581"/>
+          </a:xfrm>
+          <a:prstGeom prst="line">
+            <a:avLst/>
+          </a:prstGeom>
+          <a:ln w="38100">
+            <a:solidFill>
+              <a:schemeClr val="tx1"/>
+            </a:solidFill>
+            <a:prstDash val="sysDash"/>
+          </a:ln>
+        </p:spPr>
+        <p:style>
+          <a:lnRef idx="1">
+            <a:schemeClr val="accent1"/>
+          </a:lnRef>
+          <a:fillRef idx="0">
+            <a:schemeClr val="accent1"/>
+          </a:fillRef>
+          <a:effectRef idx="0">
+            <a:schemeClr val="accent1"/>
+          </a:effectRef>
+          <a:fontRef idx="minor">
+            <a:schemeClr val="tx1"/>
+          </a:fontRef>
+        </p:style>
+      </p:cxnSp>
+      <p:cxnSp>
+        <p:nvCxnSpPr>
+          <p:cNvPr id="45" name="Straight Connector 44">
+            <a:extLst>
+              <a:ext uri="{FF2B5EF4-FFF2-40B4-BE49-F238E27FC236}">
+                <a16:creationId xmlns:a16="http://schemas.microsoft.com/office/drawing/2014/main" id="{3ACC5A77-FAF8-A64B-B6E0-9A2306718FA2}"/>
+              </a:ext>
+            </a:extLst>
+          </p:cNvPr>
+          <p:cNvCxnSpPr>
+            <a:cxnSpLocks/>
+          </p:cNvCxnSpPr>
+          <p:nvPr/>
+        </p:nvCxnSpPr>
+        <p:spPr>
+          <a:xfrm flipV="1">
+            <a:off x="4132509" y="2996003"/>
+            <a:ext cx="1324445" cy="953447"/>
+          </a:xfrm>
+          <a:prstGeom prst="line">
+            <a:avLst/>
+          </a:prstGeom>
+          <a:ln w="38100">
+            <a:solidFill>
+              <a:schemeClr val="tx1"/>
+            </a:solidFill>
+            <a:prstDash val="sysDash"/>
+          </a:ln>
+        </p:spPr>
+        <p:style>
+          <a:lnRef idx="1">
+            <a:schemeClr val="accent1"/>
+          </a:lnRef>
+          <a:fillRef idx="0">
+            <a:schemeClr val="accent1"/>
+          </a:fillRef>
+          <a:effectRef idx="0">
+            <a:schemeClr val="accent1"/>
+          </a:effectRef>
+          <a:fontRef idx="minor">
+            <a:schemeClr val="tx1"/>
+          </a:fontRef>
+        </p:style>
+      </p:cxnSp>
+      <p:grpSp>
+        <p:nvGrpSpPr>
+          <p:cNvPr id="11" name="Group 10">
+            <a:extLst>
+              <a:ext uri="{FF2B5EF4-FFF2-40B4-BE49-F238E27FC236}">
+                <a16:creationId xmlns:a16="http://schemas.microsoft.com/office/drawing/2014/main" id="{50CEAF5C-CC8E-5F40-A4FC-6BF348FFC225}"/>
+              </a:ext>
+            </a:extLst>
+          </p:cNvPr>
+          <p:cNvGrpSpPr/>
+          <p:nvPr/>
+        </p:nvGrpSpPr>
+        <p:grpSpPr>
+          <a:xfrm>
+            <a:off x="5171154" y="895405"/>
+            <a:ext cx="6657956" cy="4925323"/>
+            <a:chOff x="1920939" y="-45933"/>
+            <a:chExt cx="6657956" cy="4925323"/>
+          </a:xfrm>
+        </p:grpSpPr>
+        <p:sp>
+          <p:nvSpPr>
+            <p:cNvPr id="8" name="Oval 7">
+              <a:extLst>
+                <a:ext uri="{FF2B5EF4-FFF2-40B4-BE49-F238E27FC236}">
+                  <a16:creationId xmlns:a16="http://schemas.microsoft.com/office/drawing/2014/main" id="{5A2F2AE4-8ED1-FA42-B1A3-DF56E2A05531}"/>
+                </a:ext>
+              </a:extLst>
+            </p:cNvPr>
+            <p:cNvSpPr/>
+            <p:nvPr/>
+          </p:nvSpPr>
+          <p:spPr>
+            <a:xfrm>
+              <a:off x="3187757" y="713013"/>
+              <a:ext cx="3672000" cy="3672000"/>
+            </a:xfrm>
+            <a:prstGeom prst="ellipse">
+              <a:avLst/>
+            </a:prstGeom>
+            <a:solidFill>
+              <a:schemeClr val="bg1">
+                <a:lumMod val="95000"/>
+              </a:schemeClr>
+            </a:solidFill>
+            <a:ln>
+              <a:noFill/>
+            </a:ln>
+          </p:spPr>
+          <p:style>
+            <a:lnRef idx="2">
+              <a:schemeClr val="accent1">
+                <a:shade val="50000"/>
+              </a:schemeClr>
+            </a:lnRef>
+            <a:fillRef idx="1">
+              <a:schemeClr val="accent1"/>
+            </a:fillRef>
+            <a:effectRef idx="0">
+              <a:schemeClr val="accent1"/>
+            </a:effectRef>
+            <a:fontRef idx="minor">
+              <a:schemeClr val="lt1"/>
+            </a:fontRef>
+          </p:style>
+          <p:txBody>
+            <a:bodyPr rtlCol="0" anchor="ctr"/>
+            <a:lstStyle/>
+            <a:p>
+              <a:pPr algn="ctr"/>
+              <a:endParaRPr lang="en-US"/>
+            </a:p>
+          </p:txBody>
+        </p:sp>
+        <p:sp>
+          <p:nvSpPr>
+            <p:cNvPr id="5" name="Arc 4">
+              <a:extLst>
+                <a:ext uri="{FF2B5EF4-FFF2-40B4-BE49-F238E27FC236}">
+                  <a16:creationId xmlns:a16="http://schemas.microsoft.com/office/drawing/2014/main" id="{80DBDD4D-7CEC-1648-BDAF-45CA62777A77}"/>
+                </a:ext>
+              </a:extLst>
+            </p:cNvPr>
+            <p:cNvSpPr/>
+            <p:nvPr/>
+          </p:nvSpPr>
+          <p:spPr>
+            <a:xfrm rot="19578248" flipH="1">
+              <a:off x="3187757" y="723897"/>
+              <a:ext cx="3672000" cy="3672000"/>
+            </a:xfrm>
+            <a:prstGeom prst="arc">
+              <a:avLst/>
+            </a:prstGeom>
+            <a:ln w="76200">
+              <a:solidFill>
+                <a:schemeClr val="tx1"/>
+              </a:solidFill>
+              <a:headEnd type="triangle"/>
+            </a:ln>
+          </p:spPr>
+          <p:style>
+            <a:lnRef idx="1">
+              <a:schemeClr val="accent1"/>
+            </a:lnRef>
+            <a:fillRef idx="0">
+              <a:schemeClr val="accent1"/>
+            </a:fillRef>
+            <a:effectRef idx="0">
+              <a:schemeClr val="accent1"/>
+            </a:effectRef>
+            <a:fontRef idx="minor">
+              <a:schemeClr val="tx1"/>
+            </a:fontRef>
+          </p:style>
+          <p:txBody>
+            <a:bodyPr rtlCol="0" anchor="ctr"/>
+            <a:lstStyle/>
+            <a:p>
+              <a:pPr algn="ctr"/>
+              <a:endParaRPr lang="en-US" dirty="0"/>
+            </a:p>
+          </p:txBody>
+        </p:sp>
+        <p:sp>
+          <p:nvSpPr>
+            <p:cNvPr id="26" name="Arc 25">
+              <a:extLst>
+                <a:ext uri="{FF2B5EF4-FFF2-40B4-BE49-F238E27FC236}">
+                  <a16:creationId xmlns:a16="http://schemas.microsoft.com/office/drawing/2014/main" id="{2385E4DF-71C6-0B48-A1FF-A7953CC77497}"/>
+                </a:ext>
+              </a:extLst>
+            </p:cNvPr>
+            <p:cNvSpPr/>
+            <p:nvPr/>
+          </p:nvSpPr>
+          <p:spPr>
+            <a:xfrm rot="13427569" flipH="1">
+              <a:off x="3187757" y="726954"/>
+              <a:ext cx="3672000" cy="3672000"/>
+            </a:xfrm>
+            <a:prstGeom prst="arc">
+              <a:avLst>
+                <a:gd name="adj1" fmla="val 16200000"/>
+                <a:gd name="adj2" fmla="val 433081"/>
+              </a:avLst>
+            </a:prstGeom>
+            <a:ln w="76200">
+              <a:solidFill>
+                <a:schemeClr val="tx1"/>
+              </a:solidFill>
+              <a:headEnd type="triangle"/>
+            </a:ln>
+          </p:spPr>
+          <p:style>
+            <a:lnRef idx="1">
+              <a:schemeClr val="accent1"/>
+            </a:lnRef>
+            <a:fillRef idx="0">
+              <a:schemeClr val="accent1"/>
+            </a:fillRef>
+            <a:effectRef idx="0">
+              <a:schemeClr val="accent1"/>
+            </a:effectRef>
+            <a:fontRef idx="minor">
+              <a:schemeClr val="tx1"/>
+            </a:fontRef>
+          </p:style>
+          <p:txBody>
+            <a:bodyPr rtlCol="0" anchor="ctr"/>
+            <a:lstStyle/>
+            <a:p>
+              <a:pPr algn="ctr"/>
+              <a:endParaRPr lang="en-US" dirty="0"/>
+            </a:p>
+          </p:txBody>
+        </p:sp>
+        <p:sp>
+          <p:nvSpPr>
+            <p:cNvPr id="27" name="Arc 26">
+              <a:extLst>
+                <a:ext uri="{FF2B5EF4-FFF2-40B4-BE49-F238E27FC236}">
+                  <a16:creationId xmlns:a16="http://schemas.microsoft.com/office/drawing/2014/main" id="{A4B0BC76-CFFD-374A-AB1F-8E9148699FC8}"/>
+                </a:ext>
+              </a:extLst>
+            </p:cNvPr>
+            <p:cNvSpPr/>
+            <p:nvPr/>
+          </p:nvSpPr>
+          <p:spPr>
+            <a:xfrm rot="6491453" flipH="1">
+              <a:off x="3199727" y="726954"/>
+              <a:ext cx="3672000" cy="3672000"/>
+            </a:xfrm>
+            <a:prstGeom prst="arc">
+              <a:avLst/>
+            </a:prstGeom>
+            <a:ln w="76200">
+              <a:solidFill>
+                <a:schemeClr val="tx1"/>
+              </a:solidFill>
+              <a:headEnd type="triangle"/>
+            </a:ln>
+          </p:spPr>
+          <p:style>
+            <a:lnRef idx="1">
+              <a:schemeClr val="accent1"/>
+            </a:lnRef>
+            <a:fillRef idx="0">
+              <a:schemeClr val="accent1"/>
+            </a:fillRef>
+            <a:effectRef idx="0">
+              <a:schemeClr val="accent1"/>
+            </a:effectRef>
+            <a:fontRef idx="minor">
+              <a:schemeClr val="tx1"/>
+            </a:fontRef>
+          </p:style>
+          <p:txBody>
+            <a:bodyPr rtlCol="0" anchor="ctr"/>
+            <a:lstStyle/>
+            <a:p>
+              <a:pPr algn="ctr"/>
+              <a:endParaRPr lang="en-US" dirty="0"/>
+            </a:p>
+          </p:txBody>
+        </p:sp>
+        <p:sp>
+          <p:nvSpPr>
+            <p:cNvPr id="7" name="Rounded Rectangle 6">
+              <a:extLst>
+                <a:ext uri="{FF2B5EF4-FFF2-40B4-BE49-F238E27FC236}">
+                  <a16:creationId xmlns:a16="http://schemas.microsoft.com/office/drawing/2014/main" id="{B6639E3C-F7FD-4344-9E6E-A631DC9D2184}"/>
+                </a:ext>
+              </a:extLst>
+            </p:cNvPr>
+            <p:cNvSpPr/>
+            <p:nvPr/>
+          </p:nvSpPr>
+          <p:spPr>
+            <a:xfrm>
+              <a:off x="4109357" y="587827"/>
+              <a:ext cx="1828800" cy="533400"/>
+            </a:xfrm>
+            <a:prstGeom prst="roundRect">
+              <a:avLst/>
+            </a:prstGeom>
+            <a:solidFill>
+              <a:schemeClr val="bg1">
+                <a:lumMod val="85000"/>
+              </a:schemeClr>
+            </a:solidFill>
+            <a:ln w="28575">
+              <a:solidFill>
+                <a:schemeClr val="tx1"/>
+              </a:solidFill>
+            </a:ln>
+          </p:spPr>
+          <p:style>
+            <a:lnRef idx="2">
+              <a:schemeClr val="accent1">
+                <a:shade val="50000"/>
+              </a:schemeClr>
+            </a:lnRef>
+            <a:fillRef idx="1">
+              <a:schemeClr val="accent1"/>
+            </a:fillRef>
+            <a:effectRef idx="0">
+              <a:schemeClr val="accent1"/>
+            </a:effectRef>
+            <a:fontRef idx="minor">
+              <a:schemeClr val="lt1"/>
+            </a:fontRef>
+          </p:style>
+          <p:txBody>
+            <a:bodyPr rtlCol="0" anchor="ctr"/>
+            <a:lstStyle/>
+            <a:p>
+              <a:pPr algn="ctr"/>
+              <a:r>
+                <a:rPr lang="en-US" sz="2000" b="1" dirty="0">
+                  <a:solidFill>
+                    <a:schemeClr val="tx1"/>
+                  </a:solidFill>
+                </a:rPr>
+                <a:t>Value / Policy</a:t>
+              </a:r>
+            </a:p>
+          </p:txBody>
+        </p:sp>
+        <p:sp>
+          <p:nvSpPr>
+            <p:cNvPr id="23" name="Rounded Rectangle 22">
+              <a:extLst>
+                <a:ext uri="{FF2B5EF4-FFF2-40B4-BE49-F238E27FC236}">
+                  <a16:creationId xmlns:a16="http://schemas.microsoft.com/office/drawing/2014/main" id="{6A6AD88F-ADFA-4D4A-A3A7-77D828589413}"/>
+                </a:ext>
+              </a:extLst>
+            </p:cNvPr>
+            <p:cNvSpPr/>
+            <p:nvPr/>
+          </p:nvSpPr>
+          <p:spPr>
+            <a:xfrm>
+              <a:off x="2813958" y="3238500"/>
+              <a:ext cx="1594756" cy="533400"/>
+            </a:xfrm>
+            <a:prstGeom prst="roundRect">
+              <a:avLst/>
+            </a:prstGeom>
+            <a:solidFill>
+              <a:schemeClr val="bg1">
+                <a:lumMod val="85000"/>
+              </a:schemeClr>
+            </a:solidFill>
+            <a:ln w="28575">
+              <a:solidFill>
+                <a:schemeClr val="tx1"/>
+              </a:solidFill>
+            </a:ln>
+          </p:spPr>
+          <p:style>
+            <a:lnRef idx="2">
+              <a:schemeClr val="accent1">
+                <a:shade val="50000"/>
+              </a:schemeClr>
+            </a:lnRef>
+            <a:fillRef idx="1">
+              <a:schemeClr val="accent1"/>
+            </a:fillRef>
+            <a:effectRef idx="0">
+              <a:schemeClr val="accent1"/>
+            </a:effectRef>
+            <a:fontRef idx="minor">
+              <a:schemeClr val="lt1"/>
+            </a:fontRef>
+          </p:style>
+          <p:txBody>
+            <a:bodyPr rtlCol="0" anchor="ctr"/>
+            <a:lstStyle/>
+            <a:p>
+              <a:pPr algn="ctr"/>
+              <a:r>
+                <a:rPr lang="en-US" sz="2000" b="1" dirty="0">
+                  <a:solidFill>
+                    <a:schemeClr val="tx1"/>
+                  </a:solidFill>
+                </a:rPr>
+                <a:t>Model</a:t>
+              </a:r>
+            </a:p>
+          </p:txBody>
+        </p:sp>
+        <p:sp>
+          <p:nvSpPr>
+            <p:cNvPr id="30" name="Arc 29">
+              <a:extLst>
+                <a:ext uri="{FF2B5EF4-FFF2-40B4-BE49-F238E27FC236}">
+                  <a16:creationId xmlns:a16="http://schemas.microsoft.com/office/drawing/2014/main" id="{1DA709FA-DCAB-DC43-A7B5-2057C3F705AD}"/>
+                </a:ext>
+              </a:extLst>
+            </p:cNvPr>
+            <p:cNvSpPr/>
+            <p:nvPr/>
+          </p:nvSpPr>
+          <p:spPr>
+            <a:xfrm rot="17291453" flipH="1">
+              <a:off x="4906895" y="-45933"/>
+              <a:ext cx="3672000" cy="3672000"/>
+            </a:xfrm>
+            <a:prstGeom prst="arc">
+              <a:avLst/>
+            </a:prstGeom>
+            <a:ln w="76200">
+              <a:solidFill>
+                <a:schemeClr val="tx1"/>
+              </a:solidFill>
+              <a:headEnd type="triangle"/>
+            </a:ln>
+          </p:spPr>
+          <p:style>
+            <a:lnRef idx="1">
+              <a:schemeClr val="accent1"/>
+            </a:lnRef>
+            <a:fillRef idx="0">
+              <a:schemeClr val="accent1"/>
+            </a:fillRef>
+            <a:effectRef idx="0">
+              <a:schemeClr val="accent1"/>
+            </a:effectRef>
+            <a:fontRef idx="minor">
+              <a:schemeClr val="tx1"/>
+            </a:fontRef>
+          </p:style>
+          <p:txBody>
+            <a:bodyPr rtlCol="0" anchor="ctr"/>
+            <a:lstStyle/>
+            <a:p>
+              <a:pPr algn="ctr"/>
+              <a:endParaRPr lang="en-US" dirty="0"/>
+            </a:p>
+          </p:txBody>
+        </p:sp>
+        <p:sp>
+          <p:nvSpPr>
+            <p:cNvPr id="24" name="Rounded Rectangle 23">
+              <a:extLst>
+                <a:ext uri="{FF2B5EF4-FFF2-40B4-BE49-F238E27FC236}">
+                  <a16:creationId xmlns:a16="http://schemas.microsoft.com/office/drawing/2014/main" id="{54E106DD-DFF7-A34D-B5FD-C88740CB3D2A}"/>
+                </a:ext>
+              </a:extLst>
+            </p:cNvPr>
+            <p:cNvSpPr/>
+            <p:nvPr/>
+          </p:nvSpPr>
+          <p:spPr>
+            <a:xfrm>
+              <a:off x="5638800" y="3238500"/>
+              <a:ext cx="1594756" cy="533400"/>
+            </a:xfrm>
+            <a:prstGeom prst="roundRect">
+              <a:avLst/>
+            </a:prstGeom>
+            <a:solidFill>
+              <a:schemeClr val="bg1">
+                <a:lumMod val="85000"/>
+              </a:schemeClr>
+            </a:solidFill>
+            <a:ln w="28575">
+              <a:solidFill>
+                <a:schemeClr val="tx1"/>
+              </a:solidFill>
+            </a:ln>
+          </p:spPr>
+          <p:style>
+            <a:lnRef idx="2">
+              <a:schemeClr val="accent1">
+                <a:shade val="50000"/>
+              </a:schemeClr>
+            </a:lnRef>
+            <a:fillRef idx="1">
+              <a:schemeClr val="accent1"/>
+            </a:fillRef>
+            <a:effectRef idx="0">
+              <a:schemeClr val="accent1"/>
+            </a:effectRef>
+            <a:fontRef idx="minor">
+              <a:schemeClr val="lt1"/>
+            </a:fontRef>
+          </p:style>
+          <p:txBody>
+            <a:bodyPr rtlCol="0" anchor="ctr"/>
+            <a:lstStyle/>
+            <a:p>
+              <a:pPr algn="ctr"/>
+              <a:r>
+                <a:rPr lang="en-US" sz="2000" b="1" dirty="0">
+                  <a:solidFill>
+                    <a:schemeClr val="tx1"/>
+                  </a:solidFill>
+                </a:rPr>
+                <a:t>Experience</a:t>
+              </a:r>
+            </a:p>
+          </p:txBody>
+        </p:sp>
+        <p:sp>
+          <p:nvSpPr>
+            <p:cNvPr id="32" name="Rounded Rectangle 31">
+              <a:extLst>
+                <a:ext uri="{FF2B5EF4-FFF2-40B4-BE49-F238E27FC236}">
+                  <a16:creationId xmlns:a16="http://schemas.microsoft.com/office/drawing/2014/main" id="{4A8227BD-89C7-A04A-AD06-39BA4758C93F}"/>
+                </a:ext>
+              </a:extLst>
+            </p:cNvPr>
+            <p:cNvSpPr/>
+            <p:nvPr/>
+          </p:nvSpPr>
+          <p:spPr>
+            <a:xfrm>
+              <a:off x="1920939" y="1709057"/>
+              <a:ext cx="1594756" cy="533400"/>
+            </a:xfrm>
+            <a:prstGeom prst="roundRect">
+              <a:avLst/>
+            </a:prstGeom>
+            <a:noFill/>
+            <a:ln w="28575">
+              <a:noFill/>
+            </a:ln>
+          </p:spPr>
+          <p:style>
+            <a:lnRef idx="2">
+              <a:schemeClr val="accent1">
+                <a:shade val="50000"/>
+              </a:schemeClr>
+            </a:lnRef>
+            <a:fillRef idx="1">
+              <a:schemeClr val="accent1"/>
+            </a:fillRef>
+            <a:effectRef idx="0">
+              <a:schemeClr val="accent1"/>
+            </a:effectRef>
+            <a:fontRef idx="minor">
+              <a:schemeClr val="lt1"/>
+            </a:fontRef>
+          </p:style>
+          <p:txBody>
+            <a:bodyPr rtlCol="0" anchor="ctr"/>
+            <a:lstStyle/>
+            <a:p>
+              <a:pPr algn="ctr"/>
+              <a:r>
+                <a:rPr lang="en-US" sz="2000" b="1" dirty="0">
+                  <a:solidFill>
+                    <a:schemeClr val="tx1"/>
+                  </a:solidFill>
+                </a:rPr>
+                <a:t>Planning</a:t>
+              </a:r>
+            </a:p>
+          </p:txBody>
+        </p:sp>
+        <p:sp>
+          <p:nvSpPr>
+            <p:cNvPr id="33" name="Rounded Rectangle 32">
+              <a:extLst>
+                <a:ext uri="{FF2B5EF4-FFF2-40B4-BE49-F238E27FC236}">
+                  <a16:creationId xmlns:a16="http://schemas.microsoft.com/office/drawing/2014/main" id="{2556725F-049C-CE42-96C9-B9325EA34345}"/>
+                </a:ext>
+              </a:extLst>
+            </p:cNvPr>
+            <p:cNvSpPr/>
+            <p:nvPr/>
+          </p:nvSpPr>
+          <p:spPr>
+            <a:xfrm>
+              <a:off x="6436178" y="1706554"/>
+              <a:ext cx="1594756" cy="533400"/>
+            </a:xfrm>
+            <a:prstGeom prst="roundRect">
+              <a:avLst/>
+            </a:prstGeom>
+            <a:noFill/>
+            <a:ln w="28575">
+              <a:noFill/>
+            </a:ln>
+          </p:spPr>
+          <p:style>
+            <a:lnRef idx="2">
+              <a:schemeClr val="accent1">
+                <a:shade val="50000"/>
+              </a:schemeClr>
+            </a:lnRef>
+            <a:fillRef idx="1">
+              <a:schemeClr val="accent1"/>
+            </a:fillRef>
+            <a:effectRef idx="0">
+              <a:schemeClr val="accent1"/>
+            </a:effectRef>
+            <a:fontRef idx="minor">
+              <a:schemeClr val="lt1"/>
+            </a:fontRef>
+          </p:style>
+          <p:txBody>
+            <a:bodyPr rtlCol="0" anchor="ctr"/>
+            <a:lstStyle/>
+            <a:p>
+              <a:pPr algn="ctr"/>
+              <a:r>
+                <a:rPr lang="en-US" sz="2000" b="1" dirty="0">
+                  <a:solidFill>
+                    <a:schemeClr val="tx1"/>
+                  </a:solidFill>
+                </a:rPr>
+                <a:t>Acting</a:t>
+              </a:r>
+            </a:p>
+          </p:txBody>
+        </p:sp>
+        <p:sp>
+          <p:nvSpPr>
+            <p:cNvPr id="34" name="Rounded Rectangle 33">
+              <a:extLst>
+                <a:ext uri="{FF2B5EF4-FFF2-40B4-BE49-F238E27FC236}">
+                  <a16:creationId xmlns:a16="http://schemas.microsoft.com/office/drawing/2014/main" id="{6D440356-84C1-A345-86F0-FDE28B7DB170}"/>
+                </a:ext>
+              </a:extLst>
+            </p:cNvPr>
+            <p:cNvSpPr/>
+            <p:nvPr/>
+          </p:nvSpPr>
+          <p:spPr>
+            <a:xfrm>
+              <a:off x="4753423" y="2080952"/>
+              <a:ext cx="1594756" cy="533400"/>
+            </a:xfrm>
+            <a:prstGeom prst="roundRect">
+              <a:avLst/>
+            </a:prstGeom>
+            <a:noFill/>
+            <a:ln w="28575">
+              <a:noFill/>
+            </a:ln>
+          </p:spPr>
+          <p:style>
+            <a:lnRef idx="2">
+              <a:schemeClr val="accent1">
+                <a:shade val="50000"/>
+              </a:schemeClr>
+            </a:lnRef>
+            <a:fillRef idx="1">
+              <a:schemeClr val="accent1"/>
+            </a:fillRef>
+            <a:effectRef idx="0">
+              <a:schemeClr val="accent1"/>
+            </a:effectRef>
+            <a:fontRef idx="minor">
+              <a:schemeClr val="lt1"/>
+            </a:fontRef>
+          </p:style>
+          <p:txBody>
+            <a:bodyPr rtlCol="0" anchor="ctr"/>
+            <a:lstStyle/>
+            <a:p>
+              <a:pPr algn="ctr"/>
+              <a:r>
+                <a:rPr lang="en-US" sz="2000" b="1" dirty="0">
+                  <a:solidFill>
+                    <a:schemeClr val="tx1"/>
+                  </a:solidFill>
+                </a:rPr>
+                <a:t>Direct RL</a:t>
+              </a:r>
+            </a:p>
+          </p:txBody>
+        </p:sp>
+        <p:sp>
+          <p:nvSpPr>
+            <p:cNvPr id="35" name="Rounded Rectangle 34">
+              <a:extLst>
+                <a:ext uri="{FF2B5EF4-FFF2-40B4-BE49-F238E27FC236}">
+                  <a16:creationId xmlns:a16="http://schemas.microsoft.com/office/drawing/2014/main" id="{D8F14CFE-243F-094D-BBDF-8109ED5F19E7}"/>
+                </a:ext>
+              </a:extLst>
+            </p:cNvPr>
+            <p:cNvSpPr/>
+            <p:nvPr/>
+          </p:nvSpPr>
+          <p:spPr>
+            <a:xfrm>
+              <a:off x="3975028" y="4345990"/>
+              <a:ext cx="2097457" cy="533400"/>
+            </a:xfrm>
+            <a:prstGeom prst="roundRect">
+              <a:avLst/>
+            </a:prstGeom>
+            <a:noFill/>
+            <a:ln w="28575">
+              <a:noFill/>
+            </a:ln>
+          </p:spPr>
+          <p:style>
+            <a:lnRef idx="2">
+              <a:schemeClr val="accent1">
+                <a:shade val="50000"/>
+              </a:schemeClr>
+            </a:lnRef>
+            <a:fillRef idx="1">
+              <a:schemeClr val="accent1"/>
+            </a:fillRef>
+            <a:effectRef idx="0">
+              <a:schemeClr val="accent1"/>
+            </a:effectRef>
+            <a:fontRef idx="minor">
+              <a:schemeClr val="lt1"/>
+            </a:fontRef>
+          </p:style>
+          <p:txBody>
+            <a:bodyPr rtlCol="0" anchor="ctr"/>
+            <a:lstStyle/>
+            <a:p>
+              <a:pPr algn="ctr"/>
+              <a:r>
+                <a:rPr lang="en-US" sz="2000" b="1" dirty="0">
+                  <a:solidFill>
+                    <a:schemeClr val="tx1"/>
+                  </a:solidFill>
+                </a:rPr>
+                <a:t>Model Learning</a:t>
+              </a:r>
+            </a:p>
+          </p:txBody>
+        </p:sp>
+      </p:grpSp>
+      <p:grpSp>
+        <p:nvGrpSpPr>
+          <p:cNvPr id="55" name="Group 54">
+            <a:extLst>
+              <a:ext uri="{FF2B5EF4-FFF2-40B4-BE49-F238E27FC236}">
+                <a16:creationId xmlns:a16="http://schemas.microsoft.com/office/drawing/2014/main" id="{A7D1A8B7-17A4-2142-8123-FCE1F1425989}"/>
+              </a:ext>
+            </a:extLst>
+          </p:cNvPr>
+          <p:cNvGrpSpPr/>
+          <p:nvPr/>
+        </p:nvGrpSpPr>
+        <p:grpSpPr>
+          <a:xfrm flipV="1">
+            <a:off x="1514065" y="1291632"/>
+            <a:ext cx="2661556" cy="2798438"/>
+            <a:chOff x="1521749" y="1723856"/>
+            <a:chExt cx="2661556" cy="2798438"/>
+          </a:xfrm>
+        </p:grpSpPr>
+        <p:sp>
+          <p:nvSpPr>
+            <p:cNvPr id="41" name="Down Arrow 40">
+              <a:extLst>
+                <a:ext uri="{FF2B5EF4-FFF2-40B4-BE49-F238E27FC236}">
+                  <a16:creationId xmlns:a16="http://schemas.microsoft.com/office/drawing/2014/main" id="{CF85B6BF-CC2C-3748-A940-F31CA254EF19}"/>
+                </a:ext>
+              </a:extLst>
+            </p:cNvPr>
+            <p:cNvSpPr/>
+            <p:nvPr/>
+          </p:nvSpPr>
+          <p:spPr>
+            <a:xfrm>
+              <a:off x="1646935" y="1723856"/>
+              <a:ext cx="2411184" cy="2798438"/>
+            </a:xfrm>
+            <a:prstGeom prst="downArrow">
+              <a:avLst>
+                <a:gd name="adj1" fmla="val 66561"/>
+                <a:gd name="adj2" fmla="val 16242"/>
+              </a:avLst>
+            </a:prstGeom>
+            <a:solidFill>
+              <a:schemeClr val="accent5">
+                <a:lumMod val="20000"/>
+                <a:lumOff val="80000"/>
+              </a:schemeClr>
+            </a:solidFill>
+            <a:ln>
+              <a:noFill/>
+            </a:ln>
+          </p:spPr>
+          <p:style>
+            <a:lnRef idx="2">
+              <a:schemeClr val="accent1">
+                <a:shade val="50000"/>
+              </a:schemeClr>
+            </a:lnRef>
+            <a:fillRef idx="1">
+              <a:schemeClr val="accent1"/>
+            </a:fillRef>
+            <a:effectRef idx="0">
+              <a:schemeClr val="accent1"/>
+            </a:effectRef>
+            <a:fontRef idx="minor">
+              <a:schemeClr val="lt1"/>
+            </a:fontRef>
+          </p:style>
+          <p:txBody>
+            <a:bodyPr rtlCol="0" anchor="ctr"/>
+            <a:lstStyle/>
+            <a:p>
+              <a:pPr algn="ctr"/>
+              <a:endParaRPr lang="en-US"/>
+            </a:p>
+          </p:txBody>
+        </p:sp>
+        <p:sp>
+          <p:nvSpPr>
+            <p:cNvPr id="37" name="Rounded Rectangle 36">
+              <a:extLst>
+                <a:ext uri="{FF2B5EF4-FFF2-40B4-BE49-F238E27FC236}">
+                  <a16:creationId xmlns:a16="http://schemas.microsoft.com/office/drawing/2014/main" id="{BDC2BCF1-46F5-AF48-8D0D-DD3F2C941375}"/>
+                </a:ext>
+              </a:extLst>
+            </p:cNvPr>
+            <p:cNvSpPr/>
+            <p:nvPr/>
+          </p:nvSpPr>
+          <p:spPr>
+            <a:xfrm flipV="1">
+              <a:off x="1521749" y="2431938"/>
+              <a:ext cx="2661556" cy="389383"/>
+            </a:xfrm>
+            <a:prstGeom prst="roundRect">
+              <a:avLst/>
+            </a:prstGeom>
+            <a:solidFill>
+              <a:schemeClr val="accent5">
+                <a:lumMod val="20000"/>
+                <a:lumOff val="80000"/>
+              </a:schemeClr>
+            </a:solidFill>
+            <a:ln w="28575">
+              <a:solidFill>
+                <a:schemeClr val="tx1"/>
+              </a:solidFill>
+            </a:ln>
+          </p:spPr>
+          <p:style>
+            <a:lnRef idx="2">
+              <a:schemeClr val="accent1">
+                <a:shade val="50000"/>
+              </a:schemeClr>
+            </a:lnRef>
+            <a:fillRef idx="1">
+              <a:schemeClr val="accent1"/>
+            </a:fillRef>
+            <a:effectRef idx="0">
+              <a:schemeClr val="accent1"/>
+            </a:effectRef>
+            <a:fontRef idx="minor">
+              <a:schemeClr val="lt1"/>
+            </a:fontRef>
+          </p:style>
+          <p:txBody>
+            <a:bodyPr rtlCol="0" anchor="ctr"/>
+            <a:lstStyle/>
+            <a:p>
+              <a:pPr algn="ctr"/>
+              <a:r>
+                <a:rPr lang="en-US" sz="2000" b="1" dirty="0">
+                  <a:solidFill>
+                    <a:schemeClr val="tx1"/>
+                  </a:solidFill>
+                </a:rPr>
+                <a:t>Simulated Experience</a:t>
+              </a:r>
+            </a:p>
+          </p:txBody>
+        </p:sp>
+        <p:sp>
+          <p:nvSpPr>
+            <p:cNvPr id="36" name="Rounded Rectangle 35">
+              <a:extLst>
+                <a:ext uri="{FF2B5EF4-FFF2-40B4-BE49-F238E27FC236}">
+                  <a16:creationId xmlns:a16="http://schemas.microsoft.com/office/drawing/2014/main" id="{F56F597A-81BF-9649-82A0-3513EC7BC918}"/>
+                </a:ext>
+              </a:extLst>
+            </p:cNvPr>
+            <p:cNvSpPr/>
+            <p:nvPr/>
+          </p:nvSpPr>
+          <p:spPr>
+            <a:xfrm flipV="1">
+              <a:off x="1521749" y="1867873"/>
+              <a:ext cx="2661556" cy="389383"/>
+            </a:xfrm>
+            <a:prstGeom prst="roundRect">
+              <a:avLst/>
+            </a:prstGeom>
+            <a:solidFill>
+              <a:schemeClr val="accent5">
+                <a:lumMod val="20000"/>
+                <a:lumOff val="80000"/>
+              </a:schemeClr>
+            </a:solidFill>
+            <a:ln w="28575">
+              <a:solidFill>
+                <a:schemeClr val="tx1"/>
+              </a:solidFill>
+            </a:ln>
+          </p:spPr>
+          <p:style>
+            <a:lnRef idx="2">
+              <a:schemeClr val="accent1">
+                <a:shade val="50000"/>
+              </a:schemeClr>
+            </a:lnRef>
+            <a:fillRef idx="1">
+              <a:schemeClr val="accent1"/>
+            </a:fillRef>
+            <a:effectRef idx="0">
+              <a:schemeClr val="accent1"/>
+            </a:effectRef>
+            <a:fontRef idx="minor">
+              <a:schemeClr val="lt1"/>
+            </a:fontRef>
+          </p:style>
+          <p:txBody>
+            <a:bodyPr rtlCol="0" anchor="ctr"/>
+            <a:lstStyle/>
+            <a:p>
+              <a:pPr algn="ctr"/>
+              <a:r>
+                <a:rPr lang="en-US" sz="2000" b="1" dirty="0">
+                  <a:solidFill>
+                    <a:schemeClr val="tx1"/>
+                  </a:solidFill>
+                </a:rPr>
+                <a:t>Model</a:t>
+              </a:r>
+            </a:p>
+          </p:txBody>
+        </p:sp>
+        <p:sp>
+          <p:nvSpPr>
+            <p:cNvPr id="39" name="Rounded Rectangle 38">
+              <a:extLst>
+                <a:ext uri="{FF2B5EF4-FFF2-40B4-BE49-F238E27FC236}">
+                  <a16:creationId xmlns:a16="http://schemas.microsoft.com/office/drawing/2014/main" id="{BB681007-5B59-DC4D-BEA0-4C673AE4BD79}"/>
+                </a:ext>
+              </a:extLst>
+            </p:cNvPr>
+            <p:cNvSpPr/>
+            <p:nvPr/>
+          </p:nvSpPr>
+          <p:spPr>
+            <a:xfrm flipV="1">
+              <a:off x="1521749" y="2996003"/>
+              <a:ext cx="2661556" cy="389383"/>
+            </a:xfrm>
+            <a:prstGeom prst="roundRect">
+              <a:avLst/>
+            </a:prstGeom>
+            <a:solidFill>
+              <a:schemeClr val="accent5">
+                <a:lumMod val="20000"/>
+                <a:lumOff val="80000"/>
+              </a:schemeClr>
+            </a:solidFill>
+            <a:ln w="28575">
+              <a:solidFill>
+                <a:schemeClr val="tx1"/>
+              </a:solidFill>
+            </a:ln>
+          </p:spPr>
+          <p:style>
+            <a:lnRef idx="2">
+              <a:schemeClr val="accent1">
+                <a:shade val="50000"/>
+              </a:schemeClr>
+            </a:lnRef>
+            <a:fillRef idx="1">
+              <a:schemeClr val="accent1"/>
+            </a:fillRef>
+            <a:effectRef idx="0">
+              <a:schemeClr val="accent1"/>
+            </a:effectRef>
+            <a:fontRef idx="minor">
+              <a:schemeClr val="lt1"/>
+            </a:fontRef>
+          </p:style>
+          <p:txBody>
+            <a:bodyPr rtlCol="0" anchor="ctr"/>
+            <a:lstStyle/>
+            <a:p>
+              <a:pPr algn="ctr"/>
+              <a:r>
+                <a:rPr lang="en-US" sz="2000" b="1" dirty="0">
+                  <a:solidFill>
+                    <a:schemeClr val="tx1"/>
+                  </a:solidFill>
+                </a:rPr>
+                <a:t>Values (TD update)</a:t>
+              </a:r>
+            </a:p>
+          </p:txBody>
+        </p:sp>
+        <p:sp>
+          <p:nvSpPr>
+            <p:cNvPr id="40" name="Rounded Rectangle 39">
+              <a:extLst>
+                <a:ext uri="{FF2B5EF4-FFF2-40B4-BE49-F238E27FC236}">
+                  <a16:creationId xmlns:a16="http://schemas.microsoft.com/office/drawing/2014/main" id="{10698869-AFEA-9A40-9756-F9D9D4D0F332}"/>
+                </a:ext>
+              </a:extLst>
+            </p:cNvPr>
+            <p:cNvSpPr/>
+            <p:nvPr/>
+          </p:nvSpPr>
+          <p:spPr>
+            <a:xfrm flipV="1">
+              <a:off x="1521749" y="3560067"/>
+              <a:ext cx="2661556" cy="389383"/>
+            </a:xfrm>
+            <a:prstGeom prst="roundRect">
+              <a:avLst/>
+            </a:prstGeom>
+            <a:solidFill>
+              <a:schemeClr val="accent5">
+                <a:lumMod val="20000"/>
+                <a:lumOff val="80000"/>
+              </a:schemeClr>
+            </a:solidFill>
+            <a:ln w="28575">
+              <a:solidFill>
+                <a:schemeClr val="tx1"/>
+              </a:solidFill>
+            </a:ln>
+          </p:spPr>
+          <p:style>
+            <a:lnRef idx="2">
+              <a:schemeClr val="accent1">
+                <a:shade val="50000"/>
+              </a:schemeClr>
+            </a:lnRef>
+            <a:fillRef idx="1">
+              <a:schemeClr val="accent1"/>
+            </a:fillRef>
+            <a:effectRef idx="0">
+              <a:schemeClr val="accent1"/>
+            </a:effectRef>
+            <a:fontRef idx="minor">
+              <a:schemeClr val="lt1"/>
+            </a:fontRef>
+          </p:style>
+          <p:txBody>
+            <a:bodyPr rtlCol="0" anchor="ctr"/>
+            <a:lstStyle/>
+            <a:p>
+              <a:pPr algn="ctr"/>
+              <a:r>
+                <a:rPr lang="en-US" sz="2000" b="1" dirty="0">
+                  <a:solidFill>
+                    <a:schemeClr val="tx1"/>
+                  </a:solidFill>
+                </a:rPr>
+                <a:t>Policy</a:t>
+              </a:r>
+            </a:p>
+          </p:txBody>
+        </p:sp>
+      </p:grpSp>
+    </p:spTree>
+    <p:extLst>
+      <p:ext uri="{BB962C8B-B14F-4D97-AF65-F5344CB8AC3E}">
+        <p14:creationId xmlns:p14="http://schemas.microsoft.com/office/powerpoint/2010/main" val="2900675795"/>
+      </p:ext>
+    </p:extLst>
+  </p:cSld>
+  <p:clrMapOvr>
+    <a:masterClrMapping/>
+  </p:clrMapOvr>
+</p:sld>
+</file>
+
 <file path=ppt/theme/theme1.xml><?xml version="1.0" encoding="utf-8"?>
 <a:theme xmlns:a="http://schemas.openxmlformats.org/drawingml/2006/main" name="Office Theme">
   <a:themeElements>

</xml_diff>